<commit_message>
update ppt ex 1
</commit_message>
<xml_diff>
--- a/ex 1.pptx
+++ b/ex 1.pptx
@@ -5,7 +5,7 @@
     <p:sldMasterId id="2147483648" r:id="rId1"/>
   </p:sldMasterIdLst>
   <p:notesMasterIdLst>
-    <p:notesMasterId r:id="rId8"/>
+    <p:notesMasterId r:id="rId9"/>
   </p:notesMasterIdLst>
   <p:sldIdLst>
     <p:sldId id="256" r:id="rId2"/>
@@ -14,6 +14,7 @@
     <p:sldId id="261" r:id="rId5"/>
     <p:sldId id="262" r:id="rId6"/>
     <p:sldId id="263" r:id="rId7"/>
+    <p:sldId id="264" r:id="rId8"/>
   </p:sldIdLst>
   <p:sldSz cx="18288000" cy="10287000"/>
   <p:notesSz cx="6858000" cy="9144000"/>
@@ -5088,14 +5089,14 @@
                     <a:p>
                       <a:pPr algn="l" rtl="0" fontAlgn="ctr"/>
                       <a:r>
-                        <a:rPr lang="en-US" sz="2400" u="none" strike="noStrike">
+                        <a:rPr lang="en-US" sz="2400" u="none" strike="noStrike" dirty="0">
                           <a:effectLst/>
                           <a:latin typeface="微軟正黑體" panose="020B0604030504040204" pitchFamily="34" charset="-120"/>
                           <a:ea typeface="微軟正黑體" panose="020B0604030504040204" pitchFamily="34" charset="-120"/>
                         </a:rPr>
                         <a:t>Precision</a:t>
                       </a:r>
-                      <a:endParaRPr lang="en-US" sz="2400" b="1" i="0" u="none" strike="noStrike">
+                      <a:endParaRPr lang="en-US" sz="2400" b="1" i="0" u="none" strike="noStrike" dirty="0">
                         <a:solidFill>
                           <a:srgbClr val="FFFFFF"/>
                         </a:solidFill>
@@ -7231,14 +7232,14 @@
               </a:lnSpc>
             </a:pPr>
             <a:r>
-              <a:rPr lang="en-US" altLang="zh-TW" sz="6607" b="1" dirty="0">
+              <a:rPr lang="en-US" altLang="zh-TW" sz="6607" b="1" dirty="0" err="1">
                 <a:solidFill>
                   <a:srgbClr val="000000"/>
                 </a:solidFill>
                 <a:latin typeface="微軟正黑體" panose="020B0604030504040204" pitchFamily="34" charset="-120"/>
                 <a:ea typeface="微軟正黑體" panose="020B0604030504040204" pitchFamily="34" charset="-120"/>
               </a:rPr>
-              <a:t>Bert</a:t>
+              <a:t>XLNet</a:t>
             </a:r>
             <a:endParaRPr lang="en-US" sz="6607" b="1" dirty="0">
               <a:solidFill>
@@ -7576,6 +7577,1287 @@
     <p:extLst>
       <p:ext uri="{BB962C8B-B14F-4D97-AF65-F5344CB8AC3E}">
         <p14:creationId xmlns:p14="http://schemas.microsoft.com/office/powerpoint/2010/main" val="1546130354"/>
+      </p:ext>
+    </p:extLst>
+  </p:cSld>
+  <p:clrMapOvr>
+    <a:masterClrMapping/>
+  </p:clrMapOvr>
+</p:sld>
+</file>
+
+<file path=ppt/slides/slide7.xml><?xml version="1.0" encoding="utf-8"?>
+<p:sld xmlns:a="http://schemas.openxmlformats.org/drawingml/2006/main" xmlns:r="http://schemas.openxmlformats.org/officeDocument/2006/relationships" xmlns:p="http://schemas.openxmlformats.org/presentationml/2006/main">
+  <p:cSld>
+    <p:spTree>
+      <p:nvGrpSpPr>
+        <p:cNvPr id="1" name=""/>
+        <p:cNvGrpSpPr/>
+        <p:nvPr/>
+      </p:nvGrpSpPr>
+      <p:grpSpPr>
+        <a:xfrm>
+          <a:off x="0" y="0"/>
+          <a:ext cx="0" cy="0"/>
+          <a:chOff x="0" y="0"/>
+          <a:chExt cx="0" cy="0"/>
+        </a:xfrm>
+      </p:grpSpPr>
+      <p:grpSp>
+        <p:nvGrpSpPr>
+          <p:cNvPr id="2" name="Group 2"/>
+          <p:cNvGrpSpPr/>
+          <p:nvPr/>
+        </p:nvGrpSpPr>
+        <p:grpSpPr>
+          <a:xfrm>
+            <a:off x="-1109662" y="0"/>
+            <a:ext cx="20507325" cy="10287000"/>
+            <a:chOff x="0" y="0"/>
+            <a:chExt cx="27343100" cy="13716000"/>
+          </a:xfrm>
+        </p:grpSpPr>
+        <p:sp>
+          <p:nvSpPr>
+            <p:cNvPr id="3" name="Freeform 3"/>
+            <p:cNvSpPr/>
+            <p:nvPr/>
+          </p:nvSpPr>
+          <p:spPr>
+            <a:xfrm>
+              <a:off x="0" y="0"/>
+              <a:ext cx="13716000" cy="13716000"/>
+            </a:xfrm>
+            <a:custGeom>
+              <a:avLst/>
+              <a:gdLst/>
+              <a:ahLst/>
+              <a:cxnLst/>
+              <a:rect l="l" t="t" r="r" b="b"/>
+              <a:pathLst>
+                <a:path w="13716000" h="13716000">
+                  <a:moveTo>
+                    <a:pt x="0" y="0"/>
+                  </a:moveTo>
+                  <a:lnTo>
+                    <a:pt x="13716000" y="0"/>
+                  </a:lnTo>
+                  <a:lnTo>
+                    <a:pt x="13716000" y="13716000"/>
+                  </a:lnTo>
+                  <a:lnTo>
+                    <a:pt x="0" y="13716000"/>
+                  </a:lnTo>
+                  <a:lnTo>
+                    <a:pt x="0" y="0"/>
+                  </a:lnTo>
+                  <a:close/>
+                </a:path>
+              </a:pathLst>
+            </a:custGeom>
+            <a:blipFill>
+              <a:blip r:embed="rId2">
+                <a:extLst>
+                  <a:ext uri="{96DAC541-7B7A-43D3-8B79-37D633B846F1}">
+                    <asvg:svgBlip xmlns:asvg="http://schemas.microsoft.com/office/drawing/2016/SVG/main" r:embed="rId3"/>
+                  </a:ext>
+                </a:extLst>
+              </a:blip>
+              <a:stretch>
+                <a:fillRect/>
+              </a:stretch>
+            </a:blipFill>
+          </p:spPr>
+        </p:sp>
+        <p:sp>
+          <p:nvSpPr>
+            <p:cNvPr id="4" name="Freeform 4"/>
+            <p:cNvSpPr/>
+            <p:nvPr/>
+          </p:nvSpPr>
+          <p:spPr>
+            <a:xfrm>
+              <a:off x="13627100" y="0"/>
+              <a:ext cx="13716000" cy="13716000"/>
+            </a:xfrm>
+            <a:custGeom>
+              <a:avLst/>
+              <a:gdLst/>
+              <a:ahLst/>
+              <a:cxnLst/>
+              <a:rect l="l" t="t" r="r" b="b"/>
+              <a:pathLst>
+                <a:path w="13716000" h="13716000">
+                  <a:moveTo>
+                    <a:pt x="0" y="0"/>
+                  </a:moveTo>
+                  <a:lnTo>
+                    <a:pt x="13716000" y="0"/>
+                  </a:lnTo>
+                  <a:lnTo>
+                    <a:pt x="13716000" y="13716000"/>
+                  </a:lnTo>
+                  <a:lnTo>
+                    <a:pt x="0" y="13716000"/>
+                  </a:lnTo>
+                  <a:lnTo>
+                    <a:pt x="0" y="0"/>
+                  </a:lnTo>
+                  <a:close/>
+                </a:path>
+              </a:pathLst>
+            </a:custGeom>
+            <a:blipFill>
+              <a:blip r:embed="rId2">
+                <a:extLst>
+                  <a:ext uri="{96DAC541-7B7A-43D3-8B79-37D633B846F1}">
+                    <asvg:svgBlip xmlns:asvg="http://schemas.microsoft.com/office/drawing/2016/SVG/main" r:embed="rId3"/>
+                  </a:ext>
+                </a:extLst>
+              </a:blip>
+              <a:stretch>
+                <a:fillRect/>
+              </a:stretch>
+            </a:blipFill>
+          </p:spPr>
+        </p:sp>
+      </p:grpSp>
+      <p:grpSp>
+        <p:nvGrpSpPr>
+          <p:cNvPr id="5" name="Group 5"/>
+          <p:cNvGrpSpPr/>
+          <p:nvPr/>
+        </p:nvGrpSpPr>
+        <p:grpSpPr>
+          <a:xfrm>
+            <a:off x="1028700" y="1505943"/>
+            <a:ext cx="16230600" cy="8093752"/>
+            <a:chOff x="0" y="0"/>
+            <a:chExt cx="4274726" cy="1718953"/>
+          </a:xfrm>
+        </p:grpSpPr>
+        <p:sp>
+          <p:nvSpPr>
+            <p:cNvPr id="6" name="Freeform 6"/>
+            <p:cNvSpPr/>
+            <p:nvPr/>
+          </p:nvSpPr>
+          <p:spPr>
+            <a:xfrm>
+              <a:off x="0" y="0"/>
+              <a:ext cx="4274726" cy="1718953"/>
+            </a:xfrm>
+            <a:custGeom>
+              <a:avLst/>
+              <a:gdLst/>
+              <a:ahLst/>
+              <a:cxnLst/>
+              <a:rect l="l" t="t" r="r" b="b"/>
+              <a:pathLst>
+                <a:path w="4274726" h="1718953">
+                  <a:moveTo>
+                    <a:pt x="0" y="0"/>
+                  </a:moveTo>
+                  <a:lnTo>
+                    <a:pt x="4274726" y="0"/>
+                  </a:lnTo>
+                  <a:lnTo>
+                    <a:pt x="4274726" y="1718953"/>
+                  </a:lnTo>
+                  <a:lnTo>
+                    <a:pt x="0" y="1718953"/>
+                  </a:lnTo>
+                  <a:close/>
+                </a:path>
+              </a:pathLst>
+            </a:custGeom>
+            <a:solidFill>
+              <a:srgbClr val="F1F2F2"/>
+            </a:solidFill>
+          </p:spPr>
+        </p:sp>
+        <p:sp>
+          <p:nvSpPr>
+            <p:cNvPr id="7" name="TextBox 7"/>
+            <p:cNvSpPr txBox="1"/>
+            <p:nvPr/>
+          </p:nvSpPr>
+          <p:spPr>
+            <a:xfrm>
+              <a:off x="0" y="-38100"/>
+              <a:ext cx="812800" cy="850900"/>
+            </a:xfrm>
+            <a:prstGeom prst="rect">
+              <a:avLst/>
+            </a:prstGeom>
+          </p:spPr>
+          <p:txBody>
+            <a:bodyPr lIns="50800" tIns="50800" rIns="50800" bIns="50800" rtlCol="0" anchor="ctr"/>
+            <a:lstStyle/>
+            <a:p>
+              <a:pPr algn="ctr">
+                <a:lnSpc>
+                  <a:spcPts val="2659"/>
+                </a:lnSpc>
+                <a:spcBef>
+                  <a:spcPct val="0"/>
+                </a:spcBef>
+              </a:pPr>
+              <a:endParaRPr/>
+            </a:p>
+          </p:txBody>
+        </p:sp>
+      </p:grpSp>
+      <p:grpSp>
+        <p:nvGrpSpPr>
+          <p:cNvPr id="8" name="Group 8"/>
+          <p:cNvGrpSpPr/>
+          <p:nvPr/>
+        </p:nvGrpSpPr>
+        <p:grpSpPr>
+          <a:xfrm>
+            <a:off x="5139012" y="687305"/>
+            <a:ext cx="8009976" cy="1730229"/>
+            <a:chOff x="0" y="0"/>
+            <a:chExt cx="2109623" cy="455698"/>
+          </a:xfrm>
+        </p:grpSpPr>
+        <p:sp>
+          <p:nvSpPr>
+            <p:cNvPr id="9" name="Freeform 9"/>
+            <p:cNvSpPr/>
+            <p:nvPr/>
+          </p:nvSpPr>
+          <p:spPr>
+            <a:xfrm>
+              <a:off x="0" y="0"/>
+              <a:ext cx="2109623" cy="455698"/>
+            </a:xfrm>
+            <a:custGeom>
+              <a:avLst/>
+              <a:gdLst/>
+              <a:ahLst/>
+              <a:cxnLst/>
+              <a:rect l="l" t="t" r="r" b="b"/>
+              <a:pathLst>
+                <a:path w="2109623" h="455698">
+                  <a:moveTo>
+                    <a:pt x="0" y="0"/>
+                  </a:moveTo>
+                  <a:lnTo>
+                    <a:pt x="2109623" y="0"/>
+                  </a:lnTo>
+                  <a:lnTo>
+                    <a:pt x="2109623" y="455698"/>
+                  </a:lnTo>
+                  <a:lnTo>
+                    <a:pt x="0" y="455698"/>
+                  </a:lnTo>
+                  <a:close/>
+                </a:path>
+              </a:pathLst>
+            </a:custGeom>
+            <a:solidFill>
+              <a:srgbClr val="DDDEDE"/>
+            </a:solidFill>
+            <a:ln w="38100">
+              <a:solidFill>
+                <a:srgbClr val="F1F2F2"/>
+              </a:solidFill>
+            </a:ln>
+          </p:spPr>
+        </p:sp>
+        <p:sp>
+          <p:nvSpPr>
+            <p:cNvPr id="10" name="TextBox 10"/>
+            <p:cNvSpPr txBox="1"/>
+            <p:nvPr/>
+          </p:nvSpPr>
+          <p:spPr>
+            <a:xfrm>
+              <a:off x="0" y="-38100"/>
+              <a:ext cx="812800" cy="850900"/>
+            </a:xfrm>
+            <a:prstGeom prst="rect">
+              <a:avLst/>
+            </a:prstGeom>
+          </p:spPr>
+          <p:txBody>
+            <a:bodyPr lIns="50800" tIns="50800" rIns="50800" bIns="50800" rtlCol="0" anchor="ctr"/>
+            <a:lstStyle/>
+            <a:p>
+              <a:pPr algn="ctr">
+                <a:lnSpc>
+                  <a:spcPts val="2659"/>
+                </a:lnSpc>
+                <a:spcBef>
+                  <a:spcPct val="0"/>
+                </a:spcBef>
+              </a:pPr>
+              <a:endParaRPr/>
+            </a:p>
+          </p:txBody>
+        </p:sp>
+      </p:grpSp>
+      <p:sp>
+        <p:nvSpPr>
+          <p:cNvPr id="17" name="Freeform 17"/>
+          <p:cNvSpPr/>
+          <p:nvPr/>
+        </p:nvSpPr>
+        <p:spPr>
+          <a:xfrm flipH="1">
+            <a:off x="16164492" y="6443050"/>
+            <a:ext cx="2189615" cy="1982597"/>
+          </a:xfrm>
+          <a:custGeom>
+            <a:avLst/>
+            <a:gdLst/>
+            <a:ahLst/>
+            <a:cxnLst/>
+            <a:rect l="l" t="t" r="r" b="b"/>
+            <a:pathLst>
+              <a:path w="2189615" h="1982597">
+                <a:moveTo>
+                  <a:pt x="2189616" y="0"/>
+                </a:moveTo>
+                <a:lnTo>
+                  <a:pt x="0" y="0"/>
+                </a:lnTo>
+                <a:lnTo>
+                  <a:pt x="0" y="1982597"/>
+                </a:lnTo>
+                <a:lnTo>
+                  <a:pt x="2189616" y="1982597"/>
+                </a:lnTo>
+                <a:lnTo>
+                  <a:pt x="2189616" y="0"/>
+                </a:lnTo>
+                <a:close/>
+              </a:path>
+            </a:pathLst>
+          </a:custGeom>
+          <a:blipFill>
+            <a:blip r:embed="rId4">
+              <a:extLst>
+                <a:ext uri="{96DAC541-7B7A-43D3-8B79-37D633B846F1}">
+                  <asvg:svgBlip xmlns:asvg="http://schemas.microsoft.com/office/drawing/2016/SVG/main" r:embed="rId5"/>
+                </a:ext>
+              </a:extLst>
+            </a:blip>
+            <a:stretch>
+              <a:fillRect/>
+            </a:stretch>
+          </a:blipFill>
+        </p:spPr>
+      </p:sp>
+      <p:sp>
+        <p:nvSpPr>
+          <p:cNvPr id="18" name="Freeform 18"/>
+          <p:cNvSpPr/>
+          <p:nvPr/>
+        </p:nvSpPr>
+        <p:spPr>
+          <a:xfrm>
+            <a:off x="-2300107" y="1028700"/>
+            <a:ext cx="4927677" cy="1532060"/>
+          </a:xfrm>
+          <a:custGeom>
+            <a:avLst/>
+            <a:gdLst/>
+            <a:ahLst/>
+            <a:cxnLst/>
+            <a:rect l="l" t="t" r="r" b="b"/>
+            <a:pathLst>
+              <a:path w="4927677" h="1532060">
+                <a:moveTo>
+                  <a:pt x="0" y="0"/>
+                </a:moveTo>
+                <a:lnTo>
+                  <a:pt x="4927677" y="0"/>
+                </a:lnTo>
+                <a:lnTo>
+                  <a:pt x="4927677" y="1532060"/>
+                </a:lnTo>
+                <a:lnTo>
+                  <a:pt x="0" y="1532060"/>
+                </a:lnTo>
+                <a:lnTo>
+                  <a:pt x="0" y="0"/>
+                </a:lnTo>
+                <a:close/>
+              </a:path>
+            </a:pathLst>
+          </a:custGeom>
+          <a:blipFill>
+            <a:blip r:embed="rId6">
+              <a:extLst>
+                <a:ext uri="{96DAC541-7B7A-43D3-8B79-37D633B846F1}">
+                  <asvg:svgBlip xmlns:asvg="http://schemas.microsoft.com/office/drawing/2016/SVG/main" r:embed="rId7"/>
+                </a:ext>
+              </a:extLst>
+            </a:blip>
+            <a:stretch>
+              <a:fillRect/>
+            </a:stretch>
+          </a:blipFill>
+        </p:spPr>
+      </p:sp>
+      <p:sp>
+        <p:nvSpPr>
+          <p:cNvPr id="19" name="TextBox 19"/>
+          <p:cNvSpPr txBox="1"/>
+          <p:nvPr/>
+        </p:nvSpPr>
+        <p:spPr>
+          <a:xfrm>
+            <a:off x="4543721" y="904875"/>
+            <a:ext cx="9200557" cy="1088952"/>
+          </a:xfrm>
+          <a:prstGeom prst="rect">
+            <a:avLst/>
+          </a:prstGeom>
+        </p:spPr>
+        <p:txBody>
+          <a:bodyPr lIns="0" tIns="0" rIns="0" bIns="0" rtlCol="0" anchor="t">
+            <a:spAutoFit/>
+          </a:bodyPr>
+          <a:lstStyle/>
+          <a:p>
+            <a:pPr algn="ctr">
+              <a:lnSpc>
+                <a:spcPts val="9250"/>
+              </a:lnSpc>
+            </a:pPr>
+            <a:r>
+              <a:rPr lang="en-US" altLang="zh-TW" sz="6607" b="1" dirty="0">
+                <a:solidFill>
+                  <a:srgbClr val="000000"/>
+                </a:solidFill>
+                <a:latin typeface="微軟正黑體" panose="020B0604030504040204" pitchFamily="34" charset="-120"/>
+                <a:ea typeface="微軟正黑體" panose="020B0604030504040204" pitchFamily="34" charset="-120"/>
+              </a:rPr>
+              <a:t>Compare</a:t>
+            </a:r>
+            <a:endParaRPr lang="en-US" sz="6607" b="1" dirty="0">
+              <a:solidFill>
+                <a:srgbClr val="000000"/>
+              </a:solidFill>
+              <a:latin typeface="微軟正黑體" panose="020B0604030504040204" pitchFamily="34" charset="-120"/>
+              <a:ea typeface="微軟正黑體" panose="020B0604030504040204" pitchFamily="34" charset="-120"/>
+            </a:endParaRPr>
+          </a:p>
+        </p:txBody>
+      </p:sp>
+      <p:graphicFrame>
+        <p:nvGraphicFramePr>
+          <p:cNvPr id="16" name="表格 15">
+            <a:extLst>
+              <a:ext uri="{FF2B5EF4-FFF2-40B4-BE49-F238E27FC236}">
+                <a16:creationId xmlns:a16="http://schemas.microsoft.com/office/drawing/2014/main" id="{8064CD24-EACB-4748-A8FB-F535D8AEECFF}"/>
+              </a:ext>
+            </a:extLst>
+          </p:cNvPr>
+          <p:cNvGraphicFramePr>
+            <a:graphicFrameLocks noGrp="1"/>
+          </p:cNvGraphicFramePr>
+          <p:nvPr>
+            <p:extLst>
+              <p:ext uri="{D42A27DB-BD31-4B8C-83A1-F6EECF244321}">
+                <p14:modId xmlns:p14="http://schemas.microsoft.com/office/powerpoint/2010/main" val="1239175141"/>
+              </p:ext>
+            </p:extLst>
+          </p:nvPr>
+        </p:nvGraphicFramePr>
+        <p:xfrm>
+          <a:off x="4101394" y="3017267"/>
+          <a:ext cx="10085213" cy="5965141"/>
+        </p:xfrm>
+        <a:graphic>
+          <a:graphicData uri="http://schemas.openxmlformats.org/drawingml/2006/table">
+            <a:tbl>
+              <a:tblPr>
+                <a:tableStyleId>{9D7B26C5-4107-4FEC-AEDC-1716B250A1EF}</a:tableStyleId>
+              </a:tblPr>
+              <a:tblGrid>
+                <a:gridCol w="2709493">
+                  <a:extLst>
+                    <a:ext uri="{9D8B030D-6E8A-4147-A177-3AD203B41FA5}">
+                      <a16:colId xmlns:a16="http://schemas.microsoft.com/office/drawing/2014/main" val="1360818775"/>
+                    </a:ext>
+                  </a:extLst>
+                </a:gridCol>
+                <a:gridCol w="1843930">
+                  <a:extLst>
+                    <a:ext uri="{9D8B030D-6E8A-4147-A177-3AD203B41FA5}">
+                      <a16:colId xmlns:a16="http://schemas.microsoft.com/office/drawing/2014/main" val="3044988095"/>
+                    </a:ext>
+                  </a:extLst>
+                </a:gridCol>
+                <a:gridCol w="1843930">
+                  <a:extLst>
+                    <a:ext uri="{9D8B030D-6E8A-4147-A177-3AD203B41FA5}">
+                      <a16:colId xmlns:a16="http://schemas.microsoft.com/office/drawing/2014/main" val="831794710"/>
+                    </a:ext>
+                  </a:extLst>
+                </a:gridCol>
+                <a:gridCol w="1843930">
+                  <a:extLst>
+                    <a:ext uri="{9D8B030D-6E8A-4147-A177-3AD203B41FA5}">
+                      <a16:colId xmlns:a16="http://schemas.microsoft.com/office/drawing/2014/main" val="3638054601"/>
+                    </a:ext>
+                  </a:extLst>
+                </a:gridCol>
+                <a:gridCol w="1843930">
+                  <a:extLst>
+                    <a:ext uri="{9D8B030D-6E8A-4147-A177-3AD203B41FA5}">
+                      <a16:colId xmlns:a16="http://schemas.microsoft.com/office/drawing/2014/main" val="1409984892"/>
+                    </a:ext>
+                  </a:extLst>
+                </a:gridCol>
+              </a:tblGrid>
+              <a:tr h="1439177">
+                <a:tc>
+                  <a:txBody>
+                    <a:bodyPr/>
+                    <a:lstStyle/>
+                    <a:p>
+                      <a:pPr algn="l" rtl="0" fontAlgn="ctr"/>
+                      <a:endParaRPr lang="en-US" sz="2400" b="1" i="0" u="none" strike="noStrike" dirty="0">
+                        <a:solidFill>
+                          <a:srgbClr val="FFFFFF"/>
+                        </a:solidFill>
+                        <a:effectLst/>
+                        <a:latin typeface="微軟正黑體" panose="020B0604030504040204" pitchFamily="34" charset="-120"/>
+                        <a:ea typeface="微軟正黑體" panose="020B0604030504040204" pitchFamily="34" charset="-120"/>
+                      </a:endParaRPr>
+                    </a:p>
+                  </a:txBody>
+                  <a:tcPr marL="3308" marR="3308" marT="3308" marB="0" anchor="ctr"/>
+                </a:tc>
+                <a:tc>
+                  <a:txBody>
+                    <a:bodyPr/>
+                    <a:lstStyle/>
+                    <a:p>
+                      <a:pPr algn="ctr" rtl="0" fontAlgn="ctr"/>
+                      <a:r>
+                        <a:rPr lang="en-US" altLang="zh-TW" sz="2400" b="0" i="0" u="none" strike="noStrike" dirty="0">
+                          <a:solidFill>
+                            <a:srgbClr val="000000"/>
+                          </a:solidFill>
+                          <a:effectLst/>
+                          <a:latin typeface="微軟正黑體" panose="020B0604030504040204" pitchFamily="34" charset="-120"/>
+                          <a:ea typeface="微軟正黑體" panose="020B0604030504040204" pitchFamily="34" charset="-120"/>
+                        </a:rPr>
+                        <a:t>Bert</a:t>
+                      </a:r>
+                    </a:p>
+                  </a:txBody>
+                  <a:tcPr marL="3308" marR="3308" marT="3308" marB="0" anchor="ctr">
+                    <a:solidFill>
+                      <a:schemeClr val="accent2">
+                        <a:lumMod val="20000"/>
+                        <a:lumOff val="80000"/>
+                      </a:schemeClr>
+                    </a:solidFill>
+                  </a:tcPr>
+                </a:tc>
+                <a:tc>
+                  <a:txBody>
+                    <a:bodyPr/>
+                    <a:lstStyle/>
+                    <a:p>
+                      <a:pPr algn="ctr" rtl="0" fontAlgn="ctr"/>
+                      <a:r>
+                        <a:rPr lang="en-US" altLang="zh-TW" sz="2400" b="0" i="0" u="none" strike="noStrike" dirty="0">
+                          <a:solidFill>
+                            <a:srgbClr val="000000"/>
+                          </a:solidFill>
+                          <a:effectLst/>
+                          <a:latin typeface="微軟正黑體" panose="020B0604030504040204" pitchFamily="34" charset="-120"/>
+                          <a:ea typeface="微軟正黑體" panose="020B0604030504040204" pitchFamily="34" charset="-120"/>
+                        </a:rPr>
+                        <a:t>Albert</a:t>
+                      </a:r>
+                    </a:p>
+                  </a:txBody>
+                  <a:tcPr marL="3308" marR="3308" marT="3308" marB="0" anchor="ctr"/>
+                </a:tc>
+                <a:tc>
+                  <a:txBody>
+                    <a:bodyPr/>
+                    <a:lstStyle/>
+                    <a:p>
+                      <a:pPr marL="0" marR="0" lvl="0" indent="0" algn="ctr" defTabSz="914400" rtl="0" eaLnBrk="1" fontAlgn="ctr" latinLnBrk="0" hangingPunct="1">
+                        <a:lnSpc>
+                          <a:spcPct val="100000"/>
+                        </a:lnSpc>
+                        <a:spcBef>
+                          <a:spcPts val="0"/>
+                        </a:spcBef>
+                        <a:spcAft>
+                          <a:spcPts val="0"/>
+                        </a:spcAft>
+                        <a:buClrTx/>
+                        <a:buSzTx/>
+                        <a:buFontTx/>
+                        <a:buNone/>
+                        <a:tabLst/>
+                        <a:defRPr/>
+                      </a:pPr>
+                      <a:r>
+                        <a:rPr lang="en-US" altLang="zh-TW" sz="2400" u="none" strike="noStrike" kern="1200" dirty="0" err="1">
+                          <a:solidFill>
+                            <a:schemeClr val="tx1"/>
+                          </a:solidFill>
+                          <a:effectLst/>
+                          <a:latin typeface="微軟正黑體" panose="020B0604030504040204" pitchFamily="34" charset="-120"/>
+                          <a:ea typeface="微軟正黑體" panose="020B0604030504040204" pitchFamily="34" charset="-120"/>
+                          <a:cs typeface="+mn-cs"/>
+                        </a:rPr>
+                        <a:t>DistilBert</a:t>
+                      </a:r>
+                      <a:endParaRPr lang="en-US" altLang="zh-TW" sz="2400" u="none" strike="noStrike" kern="1200" dirty="0">
+                        <a:solidFill>
+                          <a:schemeClr val="tx1"/>
+                        </a:solidFill>
+                        <a:effectLst/>
+                        <a:latin typeface="微軟正黑體" panose="020B0604030504040204" pitchFamily="34" charset="-120"/>
+                        <a:ea typeface="微軟正黑體" panose="020B0604030504040204" pitchFamily="34" charset="-120"/>
+                        <a:cs typeface="+mn-cs"/>
+                      </a:endParaRPr>
+                    </a:p>
+                  </a:txBody>
+                  <a:tcPr marL="3308" marR="3308" marT="3308" marB="0" anchor="ctr"/>
+                </a:tc>
+                <a:tc>
+                  <a:txBody>
+                    <a:bodyPr/>
+                    <a:lstStyle/>
+                    <a:p>
+                      <a:pPr algn="ctr" rtl="0" fontAlgn="ctr"/>
+                      <a:r>
+                        <a:rPr lang="en-US" altLang="zh-TW" sz="2400" b="0" i="0" u="none" strike="noStrike" dirty="0" err="1">
+                          <a:solidFill>
+                            <a:srgbClr val="000000"/>
+                          </a:solidFill>
+                          <a:effectLst/>
+                          <a:latin typeface="微軟正黑體" panose="020B0604030504040204" pitchFamily="34" charset="-120"/>
+                          <a:ea typeface="微軟正黑體" panose="020B0604030504040204" pitchFamily="34" charset="-120"/>
+                        </a:rPr>
+                        <a:t>XLNet</a:t>
+                      </a:r>
+                      <a:endParaRPr lang="en-US" altLang="zh-TW" sz="2400" b="0" i="0" u="none" strike="noStrike" dirty="0">
+                        <a:solidFill>
+                          <a:srgbClr val="000000"/>
+                        </a:solidFill>
+                        <a:effectLst/>
+                        <a:latin typeface="微軟正黑體" panose="020B0604030504040204" pitchFamily="34" charset="-120"/>
+                        <a:ea typeface="微軟正黑體" panose="020B0604030504040204" pitchFamily="34" charset="-120"/>
+                      </a:endParaRPr>
+                    </a:p>
+                  </a:txBody>
+                  <a:tcPr marL="3308" marR="3308" marT="3308" marB="0" anchor="ctr"/>
+                </a:tc>
+                <a:extLst>
+                  <a:ext uri="{0D108BD9-81ED-4DB2-BD59-A6C34878D82A}">
+                    <a16:rowId xmlns:a16="http://schemas.microsoft.com/office/drawing/2014/main" val="1021275440"/>
+                  </a:ext>
+                </a:extLst>
+              </a:tr>
+              <a:tr h="1439177">
+                <a:tc>
+                  <a:txBody>
+                    <a:bodyPr/>
+                    <a:lstStyle/>
+                    <a:p>
+                      <a:pPr algn="l" rtl="0" fontAlgn="ctr"/>
+                      <a:r>
+                        <a:rPr lang="en-US" sz="2400" u="none" strike="noStrike" dirty="0">
+                          <a:effectLst/>
+                          <a:latin typeface="微軟正黑體" panose="020B0604030504040204" pitchFamily="34" charset="-120"/>
+                          <a:ea typeface="微軟正黑體" panose="020B0604030504040204" pitchFamily="34" charset="-120"/>
+                        </a:rPr>
+                        <a:t>Valid loss</a:t>
+                      </a:r>
+                      <a:endParaRPr lang="en-US" sz="2400" b="1" i="0" u="none" strike="noStrike" dirty="0">
+                        <a:solidFill>
+                          <a:srgbClr val="FFFFFF"/>
+                        </a:solidFill>
+                        <a:effectLst/>
+                        <a:latin typeface="微軟正黑體" panose="020B0604030504040204" pitchFamily="34" charset="-120"/>
+                        <a:ea typeface="微軟正黑體" panose="020B0604030504040204" pitchFamily="34" charset="-120"/>
+                      </a:endParaRPr>
+                    </a:p>
+                  </a:txBody>
+                  <a:tcPr marL="3308" marR="3308" marT="3308" marB="0" anchor="ctr"/>
+                </a:tc>
+                <a:tc>
+                  <a:txBody>
+                    <a:bodyPr/>
+                    <a:lstStyle/>
+                    <a:p>
+                      <a:pPr algn="ctr" rtl="0" fontAlgn="ctr"/>
+                      <a:r>
+                        <a:rPr lang="en-US" altLang="zh-TW" sz="2400" u="none" strike="noStrike" dirty="0">
+                          <a:effectLst/>
+                          <a:latin typeface="微軟正黑體" panose="020B0604030504040204" pitchFamily="34" charset="-120"/>
+                          <a:ea typeface="微軟正黑體" panose="020B0604030504040204" pitchFamily="34" charset="-120"/>
+                        </a:rPr>
+                        <a:t>0.4617</a:t>
+                      </a:r>
+                      <a:endParaRPr lang="en-US" altLang="zh-TW" sz="2400" b="0" i="0" u="none" strike="noStrike" dirty="0">
+                        <a:solidFill>
+                          <a:srgbClr val="000000"/>
+                        </a:solidFill>
+                        <a:effectLst/>
+                        <a:latin typeface="微軟正黑體" panose="020B0604030504040204" pitchFamily="34" charset="-120"/>
+                        <a:ea typeface="微軟正黑體" panose="020B0604030504040204" pitchFamily="34" charset="-120"/>
+                      </a:endParaRPr>
+                    </a:p>
+                  </a:txBody>
+                  <a:tcPr marL="3308" marR="3308" marT="3308" marB="0" anchor="ctr"/>
+                </a:tc>
+                <a:tc>
+                  <a:txBody>
+                    <a:bodyPr/>
+                    <a:lstStyle/>
+                    <a:p>
+                      <a:pPr algn="ctr" rtl="0" fontAlgn="ctr"/>
+                      <a:r>
+                        <a:rPr lang="en-US" altLang="zh-TW" sz="2400" u="none" strike="noStrike" dirty="0">
+                          <a:effectLst/>
+                          <a:latin typeface="微軟正黑體" panose="020B0604030504040204" pitchFamily="34" charset="-120"/>
+                          <a:ea typeface="微軟正黑體" panose="020B0604030504040204" pitchFamily="34" charset="-120"/>
+                        </a:rPr>
+                        <a:t>0.8414</a:t>
+                      </a:r>
+                      <a:endParaRPr lang="en-US" altLang="zh-TW" sz="2400" b="0" i="0" u="none" strike="noStrike" dirty="0">
+                        <a:solidFill>
+                          <a:srgbClr val="000000"/>
+                        </a:solidFill>
+                        <a:effectLst/>
+                        <a:latin typeface="微軟正黑體" panose="020B0604030504040204" pitchFamily="34" charset="-120"/>
+                        <a:ea typeface="微軟正黑體" panose="020B0604030504040204" pitchFamily="34" charset="-120"/>
+                      </a:endParaRPr>
+                    </a:p>
+                  </a:txBody>
+                  <a:tcPr marL="3308" marR="3308" marT="3308" marB="0" anchor="ctr"/>
+                </a:tc>
+                <a:tc>
+                  <a:txBody>
+                    <a:bodyPr/>
+                    <a:lstStyle/>
+                    <a:p>
+                      <a:pPr marL="0" marR="0" lvl="0" indent="0" algn="ctr" defTabSz="914400" rtl="0" eaLnBrk="1" fontAlgn="ctr" latinLnBrk="0" hangingPunct="1">
+                        <a:lnSpc>
+                          <a:spcPct val="100000"/>
+                        </a:lnSpc>
+                        <a:spcBef>
+                          <a:spcPts val="0"/>
+                        </a:spcBef>
+                        <a:spcAft>
+                          <a:spcPts val="0"/>
+                        </a:spcAft>
+                        <a:buClrTx/>
+                        <a:buSzTx/>
+                        <a:buFontTx/>
+                        <a:buNone/>
+                        <a:tabLst/>
+                        <a:defRPr/>
+                      </a:pPr>
+                      <a:r>
+                        <a:rPr lang="en-US" altLang="zh-TW" sz="2400" u="none" strike="noStrike" kern="1200" dirty="0">
+                          <a:solidFill>
+                            <a:schemeClr val="tx1"/>
+                          </a:solidFill>
+                          <a:effectLst/>
+                          <a:latin typeface="微軟正黑體" panose="020B0604030504040204" pitchFamily="34" charset="-120"/>
+                          <a:ea typeface="微軟正黑體" panose="020B0604030504040204" pitchFamily="34" charset="-120"/>
+                          <a:cs typeface="+mn-cs"/>
+                        </a:rPr>
+                        <a:t>0.7839</a:t>
+                      </a:r>
+                    </a:p>
+                  </a:txBody>
+                  <a:tcPr marL="3308" marR="3308" marT="3308" marB="0" anchor="ctr"/>
+                </a:tc>
+                <a:tc>
+                  <a:txBody>
+                    <a:bodyPr/>
+                    <a:lstStyle/>
+                    <a:p>
+                      <a:pPr algn="ctr" rtl="0" fontAlgn="ctr"/>
+                      <a:r>
+                        <a:rPr lang="en-US" altLang="zh-TW" sz="2400" u="none" strike="noStrike" dirty="0">
+                          <a:effectLst/>
+                          <a:latin typeface="微軟正黑體" panose="020B0604030504040204" pitchFamily="34" charset="-120"/>
+                          <a:ea typeface="微軟正黑體" panose="020B0604030504040204" pitchFamily="34" charset="-120"/>
+                        </a:rPr>
+                        <a:t>0.9431</a:t>
+                      </a:r>
+                      <a:endParaRPr lang="en-US" altLang="zh-TW" sz="2400" b="0" i="0" u="none" strike="noStrike" dirty="0">
+                        <a:solidFill>
+                          <a:srgbClr val="000000"/>
+                        </a:solidFill>
+                        <a:effectLst/>
+                        <a:latin typeface="微軟正黑體" panose="020B0604030504040204" pitchFamily="34" charset="-120"/>
+                        <a:ea typeface="微軟正黑體" panose="020B0604030504040204" pitchFamily="34" charset="-120"/>
+                      </a:endParaRPr>
+                    </a:p>
+                  </a:txBody>
+                  <a:tcPr marL="3308" marR="3308" marT="3308" marB="0" anchor="ctr"/>
+                </a:tc>
+                <a:extLst>
+                  <a:ext uri="{0D108BD9-81ED-4DB2-BD59-A6C34878D82A}">
+                    <a16:rowId xmlns:a16="http://schemas.microsoft.com/office/drawing/2014/main" val="4157884726"/>
+                  </a:ext>
+                </a:extLst>
+              </a:tr>
+              <a:tr h="823805">
+                <a:tc>
+                  <a:txBody>
+                    <a:bodyPr/>
+                    <a:lstStyle/>
+                    <a:p>
+                      <a:pPr algn="l" rtl="0" fontAlgn="ctr"/>
+                      <a:r>
+                        <a:rPr lang="en-US" sz="2400" u="none" strike="noStrike" dirty="0">
+                          <a:effectLst/>
+                          <a:latin typeface="微軟正黑體" panose="020B0604030504040204" pitchFamily="34" charset="-120"/>
+                          <a:ea typeface="微軟正黑體" panose="020B0604030504040204" pitchFamily="34" charset="-120"/>
+                        </a:rPr>
+                        <a:t>Valid acc</a:t>
+                      </a:r>
+                      <a:endParaRPr lang="en-US" sz="2400" b="1" i="0" u="none" strike="noStrike" dirty="0">
+                        <a:solidFill>
+                          <a:srgbClr val="FFFFFF"/>
+                        </a:solidFill>
+                        <a:effectLst/>
+                        <a:latin typeface="微軟正黑體" panose="020B0604030504040204" pitchFamily="34" charset="-120"/>
+                        <a:ea typeface="微軟正黑體" panose="020B0604030504040204" pitchFamily="34" charset="-120"/>
+                      </a:endParaRPr>
+                    </a:p>
+                  </a:txBody>
+                  <a:tcPr marL="3308" marR="3308" marT="3308" marB="0" anchor="ctr"/>
+                </a:tc>
+                <a:tc>
+                  <a:txBody>
+                    <a:bodyPr/>
+                    <a:lstStyle/>
+                    <a:p>
+                      <a:pPr algn="ctr" rtl="0" fontAlgn="ctr"/>
+                      <a:r>
+                        <a:rPr lang="en-US" altLang="zh-TW" sz="2400" u="none" strike="noStrike" dirty="0">
+                          <a:effectLst/>
+                          <a:latin typeface="微軟正黑體" panose="020B0604030504040204" pitchFamily="34" charset="-120"/>
+                          <a:ea typeface="微軟正黑體" panose="020B0604030504040204" pitchFamily="34" charset="-120"/>
+                        </a:rPr>
+                        <a:t>0.8786</a:t>
+                      </a:r>
+                      <a:endParaRPr lang="en-US" altLang="zh-TW" sz="2400" b="0" i="0" u="none" strike="noStrike" dirty="0">
+                        <a:solidFill>
+                          <a:srgbClr val="000000"/>
+                        </a:solidFill>
+                        <a:effectLst/>
+                        <a:latin typeface="微軟正黑體" panose="020B0604030504040204" pitchFamily="34" charset="-120"/>
+                        <a:ea typeface="微軟正黑體" panose="020B0604030504040204" pitchFamily="34" charset="-120"/>
+                      </a:endParaRPr>
+                    </a:p>
+                  </a:txBody>
+                  <a:tcPr marL="3308" marR="3308" marT="3308" marB="0" anchor="ctr"/>
+                </a:tc>
+                <a:tc>
+                  <a:txBody>
+                    <a:bodyPr/>
+                    <a:lstStyle/>
+                    <a:p>
+                      <a:pPr marL="0" marR="0" lvl="0" indent="0" algn="ctr" defTabSz="914400" rtl="0" eaLnBrk="1" fontAlgn="ctr" latinLnBrk="0" hangingPunct="1">
+                        <a:lnSpc>
+                          <a:spcPct val="100000"/>
+                        </a:lnSpc>
+                        <a:spcBef>
+                          <a:spcPts val="0"/>
+                        </a:spcBef>
+                        <a:spcAft>
+                          <a:spcPts val="0"/>
+                        </a:spcAft>
+                        <a:buClrTx/>
+                        <a:buSzTx/>
+                        <a:buFontTx/>
+                        <a:buNone/>
+                        <a:tabLst/>
+                        <a:defRPr/>
+                      </a:pPr>
+                      <a:r>
+                        <a:rPr lang="en-US" altLang="zh-TW" sz="2400" u="none" strike="noStrike" kern="1200" dirty="0">
+                          <a:solidFill>
+                            <a:schemeClr val="tx1"/>
+                          </a:solidFill>
+                          <a:effectLst/>
+                          <a:latin typeface="微軟正黑體" panose="020B0604030504040204" pitchFamily="34" charset="-120"/>
+                          <a:ea typeface="微軟正黑體" panose="020B0604030504040204" pitchFamily="34" charset="-120"/>
+                          <a:cs typeface="+mn-cs"/>
+                        </a:rPr>
+                        <a:t>0.7071</a:t>
+                      </a:r>
+                    </a:p>
+                  </a:txBody>
+                  <a:tcPr marL="3308" marR="3308" marT="3308" marB="0" anchor="ctr"/>
+                </a:tc>
+                <a:tc>
+                  <a:txBody>
+                    <a:bodyPr/>
+                    <a:lstStyle/>
+                    <a:p>
+                      <a:pPr marL="0" marR="0" lvl="0" indent="0" algn="ctr" defTabSz="914400" rtl="0" eaLnBrk="1" fontAlgn="ctr" latinLnBrk="0" hangingPunct="1">
+                        <a:lnSpc>
+                          <a:spcPct val="100000"/>
+                        </a:lnSpc>
+                        <a:spcBef>
+                          <a:spcPts val="0"/>
+                        </a:spcBef>
+                        <a:spcAft>
+                          <a:spcPts val="0"/>
+                        </a:spcAft>
+                        <a:buClrTx/>
+                        <a:buSzTx/>
+                        <a:buFontTx/>
+                        <a:buNone/>
+                        <a:tabLst/>
+                        <a:defRPr/>
+                      </a:pPr>
+                      <a:r>
+                        <a:rPr lang="en-US" altLang="zh-TW" sz="2400" u="none" strike="noStrike" kern="1200" dirty="0">
+                          <a:solidFill>
+                            <a:schemeClr val="tx1"/>
+                          </a:solidFill>
+                          <a:effectLst/>
+                          <a:latin typeface="微軟正黑體" panose="020B0604030504040204" pitchFamily="34" charset="-120"/>
+                          <a:ea typeface="微軟正黑體" panose="020B0604030504040204" pitchFamily="34" charset="-120"/>
+                          <a:cs typeface="+mn-cs"/>
+                        </a:rPr>
+                        <a:t>0.7429</a:t>
+                      </a:r>
+                    </a:p>
+                  </a:txBody>
+                  <a:tcPr marL="3308" marR="3308" marT="3308" marB="0" anchor="ctr"/>
+                </a:tc>
+                <a:tc>
+                  <a:txBody>
+                    <a:bodyPr/>
+                    <a:lstStyle/>
+                    <a:p>
+                      <a:pPr algn="ctr" rtl="0" fontAlgn="ctr"/>
+                      <a:r>
+                        <a:rPr lang="en-US" altLang="zh-TW" sz="2400" u="none" strike="noStrike" dirty="0">
+                          <a:effectLst/>
+                          <a:latin typeface="微軟正黑體" panose="020B0604030504040204" pitchFamily="34" charset="-120"/>
+                          <a:ea typeface="微軟正黑體" panose="020B0604030504040204" pitchFamily="34" charset="-120"/>
+                        </a:rPr>
+                        <a:t>0.6571</a:t>
+                      </a:r>
+                      <a:endParaRPr lang="en-US" altLang="zh-TW" sz="2400" b="0" i="0" u="none" strike="noStrike" dirty="0">
+                        <a:solidFill>
+                          <a:srgbClr val="000000"/>
+                        </a:solidFill>
+                        <a:effectLst/>
+                        <a:latin typeface="微軟正黑體" panose="020B0604030504040204" pitchFamily="34" charset="-120"/>
+                        <a:ea typeface="微軟正黑體" panose="020B0604030504040204" pitchFamily="34" charset="-120"/>
+                      </a:endParaRPr>
+                    </a:p>
+                  </a:txBody>
+                  <a:tcPr marL="3308" marR="3308" marT="3308" marB="0" anchor="ctr"/>
+                </a:tc>
+                <a:extLst>
+                  <a:ext uri="{0D108BD9-81ED-4DB2-BD59-A6C34878D82A}">
+                    <a16:rowId xmlns:a16="http://schemas.microsoft.com/office/drawing/2014/main" val="3344648455"/>
+                  </a:ext>
+                </a:extLst>
+              </a:tr>
+              <a:tr h="1439177">
+                <a:tc>
+                  <a:txBody>
+                    <a:bodyPr/>
+                    <a:lstStyle/>
+                    <a:p>
+                      <a:pPr algn="l" rtl="0" fontAlgn="ctr"/>
+                      <a:r>
+                        <a:rPr lang="en-US" sz="2400" u="none" strike="noStrike" dirty="0">
+                          <a:effectLst/>
+                          <a:latin typeface="微軟正黑體" panose="020B0604030504040204" pitchFamily="34" charset="-120"/>
+                          <a:ea typeface="微軟正黑體" panose="020B0604030504040204" pitchFamily="34" charset="-120"/>
+                        </a:rPr>
+                        <a:t>Macro precision</a:t>
+                      </a:r>
+                      <a:endParaRPr lang="en-US" sz="2400" b="1" i="0" u="none" strike="noStrike" dirty="0">
+                        <a:solidFill>
+                          <a:srgbClr val="FFFFFF"/>
+                        </a:solidFill>
+                        <a:effectLst/>
+                        <a:latin typeface="微軟正黑體" panose="020B0604030504040204" pitchFamily="34" charset="-120"/>
+                        <a:ea typeface="微軟正黑體" panose="020B0604030504040204" pitchFamily="34" charset="-120"/>
+                      </a:endParaRPr>
+                    </a:p>
+                  </a:txBody>
+                  <a:tcPr marL="3308" marR="3308" marT="3308" marB="0" anchor="ctr"/>
+                </a:tc>
+                <a:tc>
+                  <a:txBody>
+                    <a:bodyPr/>
+                    <a:lstStyle/>
+                    <a:p>
+                      <a:pPr algn="ctr" rtl="0" fontAlgn="ctr"/>
+                      <a:r>
+                        <a:rPr lang="en-US" altLang="zh-TW" sz="2400" u="none" strike="noStrike" dirty="0">
+                          <a:effectLst/>
+                          <a:latin typeface="微軟正黑體" panose="020B0604030504040204" pitchFamily="34" charset="-120"/>
+                          <a:ea typeface="微軟正黑體" panose="020B0604030504040204" pitchFamily="34" charset="-120"/>
+                        </a:rPr>
+                        <a:t>0.94</a:t>
+                      </a:r>
+                      <a:endParaRPr lang="en-US" altLang="zh-TW" sz="2400" b="0" i="0" u="none" strike="noStrike" dirty="0">
+                        <a:solidFill>
+                          <a:srgbClr val="000000"/>
+                        </a:solidFill>
+                        <a:effectLst/>
+                        <a:latin typeface="微軟正黑體" panose="020B0604030504040204" pitchFamily="34" charset="-120"/>
+                        <a:ea typeface="微軟正黑體" panose="020B0604030504040204" pitchFamily="34" charset="-120"/>
+                      </a:endParaRPr>
+                    </a:p>
+                  </a:txBody>
+                  <a:tcPr marL="3308" marR="3308" marT="3308" marB="0" anchor="ctr"/>
+                </a:tc>
+                <a:tc>
+                  <a:txBody>
+                    <a:bodyPr/>
+                    <a:lstStyle/>
+                    <a:p>
+                      <a:pPr algn="ctr" rtl="0" fontAlgn="ctr"/>
+                      <a:r>
+                        <a:rPr lang="en-US" altLang="zh-TW" sz="2400" u="none" strike="noStrike" dirty="0">
+                          <a:effectLst/>
+                          <a:latin typeface="微軟正黑體" panose="020B0604030504040204" pitchFamily="34" charset="-120"/>
+                          <a:ea typeface="微軟正黑體" panose="020B0604030504040204" pitchFamily="34" charset="-120"/>
+                        </a:rPr>
+                        <a:t>0.78</a:t>
+                      </a:r>
+                      <a:endParaRPr lang="en-US" altLang="zh-TW" sz="2400" b="0" i="0" u="none" strike="noStrike" dirty="0">
+                        <a:solidFill>
+                          <a:srgbClr val="000000"/>
+                        </a:solidFill>
+                        <a:effectLst/>
+                        <a:latin typeface="微軟正黑體" panose="020B0604030504040204" pitchFamily="34" charset="-120"/>
+                        <a:ea typeface="微軟正黑體" panose="020B0604030504040204" pitchFamily="34" charset="-120"/>
+                      </a:endParaRPr>
+                    </a:p>
+                  </a:txBody>
+                  <a:tcPr marL="3308" marR="3308" marT="3308" marB="0" anchor="ctr"/>
+                </a:tc>
+                <a:tc>
+                  <a:txBody>
+                    <a:bodyPr/>
+                    <a:lstStyle/>
+                    <a:p>
+                      <a:pPr algn="ctr" rtl="0" fontAlgn="ctr"/>
+                      <a:r>
+                        <a:rPr lang="en-US" altLang="zh-TW" sz="2400" u="none" strike="noStrike" dirty="0">
+                          <a:effectLst/>
+                          <a:latin typeface="微軟正黑體" panose="020B0604030504040204" pitchFamily="34" charset="-120"/>
+                          <a:ea typeface="微軟正黑體" panose="020B0604030504040204" pitchFamily="34" charset="-120"/>
+                        </a:rPr>
+                        <a:t>0.90</a:t>
+                      </a:r>
+                      <a:endParaRPr lang="en-US" altLang="zh-TW" sz="2400" b="0" i="0" u="none" strike="noStrike" dirty="0">
+                        <a:solidFill>
+                          <a:srgbClr val="000000"/>
+                        </a:solidFill>
+                        <a:effectLst/>
+                        <a:latin typeface="微軟正黑體" panose="020B0604030504040204" pitchFamily="34" charset="-120"/>
+                        <a:ea typeface="微軟正黑體" panose="020B0604030504040204" pitchFamily="34" charset="-120"/>
+                      </a:endParaRPr>
+                    </a:p>
+                  </a:txBody>
+                  <a:tcPr marL="3308" marR="3308" marT="3308" marB="0" anchor="ctr"/>
+                </a:tc>
+                <a:tc>
+                  <a:txBody>
+                    <a:bodyPr/>
+                    <a:lstStyle/>
+                    <a:p>
+                      <a:pPr algn="ctr" rtl="0" fontAlgn="ctr"/>
+                      <a:r>
+                        <a:rPr lang="en-US" altLang="zh-TW" sz="2400" u="none" strike="noStrike" dirty="0">
+                          <a:effectLst/>
+                          <a:latin typeface="微軟正黑體" panose="020B0604030504040204" pitchFamily="34" charset="-120"/>
+                          <a:ea typeface="微軟正黑體" panose="020B0604030504040204" pitchFamily="34" charset="-120"/>
+                        </a:rPr>
+                        <a:t>0.88</a:t>
+                      </a:r>
+                      <a:endParaRPr lang="en-US" altLang="zh-TW" sz="2400" b="0" i="0" u="none" strike="noStrike" dirty="0">
+                        <a:solidFill>
+                          <a:srgbClr val="000000"/>
+                        </a:solidFill>
+                        <a:effectLst/>
+                        <a:latin typeface="微軟正黑體" panose="020B0604030504040204" pitchFamily="34" charset="-120"/>
+                        <a:ea typeface="微軟正黑體" panose="020B0604030504040204" pitchFamily="34" charset="-120"/>
+                      </a:endParaRPr>
+                    </a:p>
+                  </a:txBody>
+                  <a:tcPr marL="3308" marR="3308" marT="3308" marB="0" anchor="ctr"/>
+                </a:tc>
+                <a:extLst>
+                  <a:ext uri="{0D108BD9-81ED-4DB2-BD59-A6C34878D82A}">
+                    <a16:rowId xmlns:a16="http://schemas.microsoft.com/office/drawing/2014/main" val="441318258"/>
+                  </a:ext>
+                </a:extLst>
+              </a:tr>
+              <a:tr h="823805">
+                <a:tc>
+                  <a:txBody>
+                    <a:bodyPr/>
+                    <a:lstStyle/>
+                    <a:p>
+                      <a:pPr algn="l" rtl="0" fontAlgn="ctr"/>
+                      <a:r>
+                        <a:rPr lang="en-US" sz="2400" u="none" strike="noStrike" dirty="0">
+                          <a:effectLst/>
+                          <a:latin typeface="微軟正黑體" panose="020B0604030504040204" pitchFamily="34" charset="-120"/>
+                          <a:ea typeface="微軟正黑體" panose="020B0604030504040204" pitchFamily="34" charset="-120"/>
+                        </a:rPr>
+                        <a:t>Precision</a:t>
+                      </a:r>
+                      <a:endParaRPr lang="en-US" sz="2400" b="1" i="0" u="none" strike="noStrike" dirty="0">
+                        <a:solidFill>
+                          <a:srgbClr val="FFFFFF"/>
+                        </a:solidFill>
+                        <a:effectLst/>
+                        <a:latin typeface="微軟正黑體" panose="020B0604030504040204" pitchFamily="34" charset="-120"/>
+                        <a:ea typeface="微軟正黑體" panose="020B0604030504040204" pitchFamily="34" charset="-120"/>
+                      </a:endParaRPr>
+                    </a:p>
+                  </a:txBody>
+                  <a:tcPr marL="3308" marR="3308" marT="3308" marB="0" anchor="ctr"/>
+                </a:tc>
+                <a:tc>
+                  <a:txBody>
+                    <a:bodyPr/>
+                    <a:lstStyle/>
+                    <a:p>
+                      <a:pPr algn="ctr" rtl="0" fontAlgn="ctr"/>
+                      <a:r>
+                        <a:rPr lang="en-US" altLang="zh-TW" sz="2400" u="none" strike="noStrike" dirty="0">
+                          <a:effectLst/>
+                          <a:latin typeface="微軟正黑體" panose="020B0604030504040204" pitchFamily="34" charset="-120"/>
+                          <a:ea typeface="微軟正黑體" panose="020B0604030504040204" pitchFamily="34" charset="-120"/>
+                        </a:rPr>
+                        <a:t>0.97</a:t>
+                      </a:r>
+                      <a:endParaRPr lang="en-US" altLang="zh-TW" sz="2400" b="0" i="0" u="none" strike="noStrike" dirty="0">
+                        <a:solidFill>
+                          <a:srgbClr val="000000"/>
+                        </a:solidFill>
+                        <a:effectLst/>
+                        <a:latin typeface="微軟正黑體" panose="020B0604030504040204" pitchFamily="34" charset="-120"/>
+                        <a:ea typeface="微軟正黑體" panose="020B0604030504040204" pitchFamily="34" charset="-120"/>
+                      </a:endParaRPr>
+                    </a:p>
+                  </a:txBody>
+                  <a:tcPr marL="3308" marR="3308" marT="3308" marB="0" anchor="ctr"/>
+                </a:tc>
+                <a:tc>
+                  <a:txBody>
+                    <a:bodyPr/>
+                    <a:lstStyle/>
+                    <a:p>
+                      <a:pPr algn="ctr" rtl="0" fontAlgn="ctr"/>
+                      <a:r>
+                        <a:rPr lang="en-US" altLang="zh-TW" sz="2400" u="none" strike="noStrike" dirty="0">
+                          <a:effectLst/>
+                          <a:latin typeface="微軟正黑體" panose="020B0604030504040204" pitchFamily="34" charset="-120"/>
+                          <a:ea typeface="微軟正黑體" panose="020B0604030504040204" pitchFamily="34" charset="-120"/>
+                        </a:rPr>
+                        <a:t>0.86</a:t>
+                      </a:r>
+                      <a:endParaRPr lang="en-US" altLang="zh-TW" sz="2400" b="0" i="0" u="none" strike="noStrike" dirty="0">
+                        <a:solidFill>
+                          <a:srgbClr val="000000"/>
+                        </a:solidFill>
+                        <a:effectLst/>
+                        <a:latin typeface="微軟正黑體" panose="020B0604030504040204" pitchFamily="34" charset="-120"/>
+                        <a:ea typeface="微軟正黑體" panose="020B0604030504040204" pitchFamily="34" charset="-120"/>
+                      </a:endParaRPr>
+                    </a:p>
+                  </a:txBody>
+                  <a:tcPr marL="3308" marR="3308" marT="3308" marB="0" anchor="ctr"/>
+                </a:tc>
+                <a:tc>
+                  <a:txBody>
+                    <a:bodyPr/>
+                    <a:lstStyle/>
+                    <a:p>
+                      <a:pPr algn="ctr" rtl="0" fontAlgn="ctr"/>
+                      <a:r>
+                        <a:rPr lang="en-US" altLang="zh-TW" sz="2400" u="none" strike="noStrike" dirty="0">
+                          <a:effectLst/>
+                          <a:latin typeface="微軟正黑體" panose="020B0604030504040204" pitchFamily="34" charset="-120"/>
+                          <a:ea typeface="微軟正黑體" panose="020B0604030504040204" pitchFamily="34" charset="-120"/>
+                        </a:rPr>
+                        <a:t>0.93</a:t>
+                      </a:r>
+                      <a:endParaRPr lang="en-US" altLang="zh-TW" sz="2400" b="0" i="0" u="none" strike="noStrike" dirty="0">
+                        <a:solidFill>
+                          <a:srgbClr val="000000"/>
+                        </a:solidFill>
+                        <a:effectLst/>
+                        <a:latin typeface="微軟正黑體" panose="020B0604030504040204" pitchFamily="34" charset="-120"/>
+                        <a:ea typeface="微軟正黑體" panose="020B0604030504040204" pitchFamily="34" charset="-120"/>
+                      </a:endParaRPr>
+                    </a:p>
+                  </a:txBody>
+                  <a:tcPr marL="3308" marR="3308" marT="3308" marB="0" anchor="ctr"/>
+                </a:tc>
+                <a:tc>
+                  <a:txBody>
+                    <a:bodyPr/>
+                    <a:lstStyle/>
+                    <a:p>
+                      <a:pPr algn="ctr" rtl="0" fontAlgn="ctr"/>
+                      <a:r>
+                        <a:rPr lang="en-US" altLang="zh-TW" sz="2400" u="none" strike="noStrike" dirty="0">
+                          <a:effectLst/>
+                          <a:latin typeface="微軟正黑體" panose="020B0604030504040204" pitchFamily="34" charset="-120"/>
+                          <a:ea typeface="微軟正黑體" panose="020B0604030504040204" pitchFamily="34" charset="-120"/>
+                        </a:rPr>
+                        <a:t>0.89</a:t>
+                      </a:r>
+                      <a:endParaRPr lang="en-US" altLang="zh-TW" sz="2400" b="0" i="0" u="none" strike="noStrike" dirty="0">
+                        <a:solidFill>
+                          <a:srgbClr val="000000"/>
+                        </a:solidFill>
+                        <a:effectLst/>
+                        <a:latin typeface="微軟正黑體" panose="020B0604030504040204" pitchFamily="34" charset="-120"/>
+                        <a:ea typeface="微軟正黑體" panose="020B0604030504040204" pitchFamily="34" charset="-120"/>
+                      </a:endParaRPr>
+                    </a:p>
+                  </a:txBody>
+                  <a:tcPr marL="3308" marR="3308" marT="3308" marB="0" anchor="ctr"/>
+                </a:tc>
+                <a:extLst>
+                  <a:ext uri="{0D108BD9-81ED-4DB2-BD59-A6C34878D82A}">
+                    <a16:rowId xmlns:a16="http://schemas.microsoft.com/office/drawing/2014/main" val="744361132"/>
+                  </a:ext>
+                </a:extLst>
+              </a:tr>
+            </a:tbl>
+          </a:graphicData>
+        </a:graphic>
+      </p:graphicFrame>
+    </p:spTree>
+    <p:extLst>
+      <p:ext uri="{BB962C8B-B14F-4D97-AF65-F5344CB8AC3E}">
+        <p14:creationId xmlns:p14="http://schemas.microsoft.com/office/powerpoint/2010/main" val="967546302"/>
       </p:ext>
     </p:extLst>
   </p:cSld>

</xml_diff>